<commit_message>
updated for VM data protection use cases per RPO & RTO
</commit_message>
<xml_diff>
--- a/slides/2016/vm_backup_toi_part1.pptx
+++ b/slides/2016/vm_backup_toi_part1.pptx
@@ -5,14 +5,14 @@
     <p:sldMasterId id="2147484308" r:id="rId1"/>
   </p:sldMasterIdLst>
   <p:notesMasterIdLst>
-    <p:notesMasterId r:id="rId28"/>
+    <p:notesMasterId r:id="rId29"/>
   </p:notesMasterIdLst>
   <p:sldIdLst>
     <p:sldId id="256" r:id="rId2"/>
     <p:sldId id="302" r:id="rId3"/>
-    <p:sldId id="304" r:id="rId4"/>
-    <p:sldId id="305" r:id="rId5"/>
-    <p:sldId id="306" r:id="rId6"/>
+    <p:sldId id="306" r:id="rId4"/>
+    <p:sldId id="304" r:id="rId5"/>
+    <p:sldId id="305" r:id="rId6"/>
     <p:sldId id="308" r:id="rId7"/>
     <p:sldId id="307" r:id="rId8"/>
     <p:sldId id="309" r:id="rId9"/>
@@ -20,20 +20,21 @@
     <p:sldId id="292" r:id="rId11"/>
     <p:sldId id="293" r:id="rId12"/>
     <p:sldId id="310" r:id="rId13"/>
-    <p:sldId id="321" r:id="rId14"/>
-    <p:sldId id="312" r:id="rId15"/>
-    <p:sldId id="313" r:id="rId16"/>
-    <p:sldId id="314" r:id="rId17"/>
-    <p:sldId id="315" r:id="rId18"/>
-    <p:sldId id="316" r:id="rId19"/>
-    <p:sldId id="320" r:id="rId20"/>
-    <p:sldId id="291" r:id="rId21"/>
-    <p:sldId id="318" r:id="rId22"/>
-    <p:sldId id="294" r:id="rId23"/>
-    <p:sldId id="319" r:id="rId24"/>
-    <p:sldId id="323" r:id="rId25"/>
-    <p:sldId id="324" r:id="rId26"/>
-    <p:sldId id="322" r:id="rId27"/>
+    <p:sldId id="325" r:id="rId14"/>
+    <p:sldId id="321" r:id="rId15"/>
+    <p:sldId id="312" r:id="rId16"/>
+    <p:sldId id="313" r:id="rId17"/>
+    <p:sldId id="314" r:id="rId18"/>
+    <p:sldId id="315" r:id="rId19"/>
+    <p:sldId id="316" r:id="rId20"/>
+    <p:sldId id="320" r:id="rId21"/>
+    <p:sldId id="291" r:id="rId22"/>
+    <p:sldId id="318" r:id="rId23"/>
+    <p:sldId id="294" r:id="rId24"/>
+    <p:sldId id="319" r:id="rId25"/>
+    <p:sldId id="323" r:id="rId26"/>
+    <p:sldId id="324" r:id="rId27"/>
+    <p:sldId id="322" r:id="rId28"/>
   </p:sldIdLst>
   <p:sldSz cx="9144000" cy="6858000" type="screen4x3"/>
   <p:notesSz cx="6858000" cy="9144000"/>
@@ -4071,7 +4072,7 @@
           <a:p>
             <a:fld id="{6BFB3E7A-7FE4-42EC-A9D8-2719F1F05314}" type="slidenum">
               <a:rPr lang="en-US" smtClean="0"/>
-              <a:t>3</a:t>
+              <a:t>4</a:t>
             </a:fld>
             <a:endParaRPr lang="en-US"/>
           </a:p>
@@ -4254,7 +4255,7 @@
           <a:p>
             <a:fld id="{6BFB3E7A-7FE4-42EC-A9D8-2719F1F05314}" type="slidenum">
               <a:rPr lang="en-US" smtClean="0"/>
-              <a:t>17</a:t>
+              <a:t>18</a:t>
             </a:fld>
             <a:endParaRPr lang="en-US"/>
           </a:p>
@@ -4338,7 +4339,7 @@
           <a:p>
             <a:fld id="{6BFB3E7A-7FE4-42EC-A9D8-2719F1F05314}" type="slidenum">
               <a:rPr lang="en-US" smtClean="0"/>
-              <a:t>22</a:t>
+              <a:t>23</a:t>
             </a:fld>
             <a:endParaRPr lang="en-US"/>
           </a:p>
@@ -8512,6 +8513,575 @@
         </p:nvSpPr>
         <p:spPr/>
         <p:txBody>
+          <a:bodyPr/>
+          <a:lstStyle/>
+          <a:p>
+            <a:r>
+              <a:rPr lang="en-US" dirty="0" smtClean="0"/>
+              <a:t>VM Data Protection Use Cases</a:t>
+            </a:r>
+            <a:endParaRPr lang="en-US" dirty="0"/>
+          </a:p>
+        </p:txBody>
+      </p:sp>
+      <p:graphicFrame>
+        <p:nvGraphicFramePr>
+          <p:cNvPr id="4" name="Content Placeholder 3"/>
+          <p:cNvGraphicFramePr>
+            <a:graphicFrameLocks noGrp="1"/>
+          </p:cNvGraphicFramePr>
+          <p:nvPr>
+            <p:ph sz="quarter" idx="1"/>
+            <p:extLst>
+              <p:ext uri="{D42A27DB-BD31-4B8C-83A1-F6EECF244321}">
+                <p14:modId xmlns:p14="http://schemas.microsoft.com/office/powerpoint/2010/main" val="68368726"/>
+              </p:ext>
+            </p:extLst>
+          </p:nvPr>
+        </p:nvGraphicFramePr>
+        <p:xfrm>
+          <a:off x="609600" y="2133600"/>
+          <a:ext cx="8000999" cy="3636732"/>
+        </p:xfrm>
+        <a:graphic>
+          <a:graphicData uri="http://schemas.openxmlformats.org/drawingml/2006/table">
+            <a:tbl>
+              <a:tblPr firstRow="1" bandRow="1">
+                <a:tableStyleId>{5C22544A-7EE6-4342-B048-85BDC9FD1C3A}</a:tableStyleId>
+              </a:tblPr>
+              <a:tblGrid>
+                <a:gridCol w="945931"/>
+                <a:gridCol w="873167"/>
+                <a:gridCol w="1819098"/>
+                <a:gridCol w="4362803"/>
+              </a:tblGrid>
+              <a:tr h="346220">
+                <a:tc>
+                  <a:txBody>
+                    <a:bodyPr/>
+                    <a:lstStyle/>
+                    <a:p>
+                      <a:r>
+                        <a:rPr lang="en-US" dirty="0" smtClean="0"/>
+                        <a:t>RPO</a:t>
+                      </a:r>
+                      <a:endParaRPr lang="en-US" dirty="0"/>
+                    </a:p>
+                  </a:txBody>
+                  <a:tcPr/>
+                </a:tc>
+                <a:tc>
+                  <a:txBody>
+                    <a:bodyPr/>
+                    <a:lstStyle/>
+                    <a:p>
+                      <a:r>
+                        <a:rPr lang="en-US" dirty="0" smtClean="0"/>
+                        <a:t>RTO</a:t>
+                      </a:r>
+                      <a:endParaRPr lang="en-US" dirty="0"/>
+                    </a:p>
+                  </a:txBody>
+                  <a:tcPr/>
+                </a:tc>
+                <a:tc>
+                  <a:txBody>
+                    <a:bodyPr/>
+                    <a:lstStyle/>
+                    <a:p>
+                      <a:r>
+                        <a:rPr lang="en-US" dirty="0" smtClean="0"/>
+                        <a:t>Solution</a:t>
+                      </a:r>
+                      <a:endParaRPr lang="en-US" dirty="0"/>
+                    </a:p>
+                  </a:txBody>
+                  <a:tcPr/>
+                </a:tc>
+                <a:tc>
+                  <a:txBody>
+                    <a:bodyPr/>
+                    <a:lstStyle/>
+                    <a:p>
+                      <a:r>
+                        <a:rPr lang="en-US" dirty="0" smtClean="0"/>
+                        <a:t>Comments</a:t>
+                      </a:r>
+                      <a:endParaRPr lang="en-US" dirty="0"/>
+                    </a:p>
+                  </a:txBody>
+                  <a:tcPr/>
+                </a:tc>
+              </a:tr>
+              <a:tr h="436332">
+                <a:tc rowSpan="2">
+                  <a:txBody>
+                    <a:bodyPr/>
+                    <a:lstStyle/>
+                    <a:p>
+                      <a:r>
+                        <a:rPr lang="en-US" dirty="0" smtClean="0"/>
+                        <a:t>Zero</a:t>
+                      </a:r>
+                      <a:endParaRPr lang="en-US" dirty="0"/>
+                    </a:p>
+                  </a:txBody>
+                  <a:tcPr/>
+                </a:tc>
+                <a:tc rowSpan="2">
+                  <a:txBody>
+                    <a:bodyPr/>
+                    <a:lstStyle/>
+                    <a:p>
+                      <a:r>
+                        <a:rPr lang="en-US" dirty="0" smtClean="0"/>
+                        <a:t>Minutes</a:t>
+                      </a:r>
+                      <a:endParaRPr lang="en-US" dirty="0"/>
+                    </a:p>
+                  </a:txBody>
+                  <a:tcPr/>
+                </a:tc>
+                <a:tc>
+                  <a:txBody>
+                    <a:bodyPr/>
+                    <a:lstStyle/>
+                    <a:p>
+                      <a:r>
+                        <a:rPr lang="en-US" sz="1800" dirty="0" smtClean="0"/>
+                        <a:t>Stretched</a:t>
+                      </a:r>
+                      <a:r>
+                        <a:rPr lang="en-US" dirty="0" smtClean="0"/>
+                        <a:t> clusters</a:t>
+                      </a:r>
+                      <a:endParaRPr lang="en-US" dirty="0"/>
+                    </a:p>
+                  </a:txBody>
+                  <a:tcPr/>
+                </a:tc>
+                <a:tc>
+                  <a:txBody>
+                    <a:bodyPr/>
+                    <a:lstStyle/>
+                    <a:p>
+                      <a:r>
+                        <a:rPr lang="en-US" dirty="0" smtClean="0"/>
+                        <a:t>Site level Active-Active</a:t>
+                      </a:r>
+                      <a:r>
+                        <a:rPr lang="en-US" baseline="0" dirty="0" smtClean="0"/>
+                        <a:t> HA </a:t>
+                      </a:r>
+                      <a:r>
+                        <a:rPr lang="en-US" baseline="0" dirty="0" smtClean="0"/>
+                        <a:t>&amp; </a:t>
+                      </a:r>
+                      <a:r>
+                        <a:rPr lang="en-US" baseline="0" dirty="0" smtClean="0"/>
+                        <a:t>load balance</a:t>
+                      </a:r>
+                      <a:endParaRPr lang="en-US" dirty="0"/>
+                    </a:p>
+                  </a:txBody>
+                  <a:tcPr/>
+                </a:tc>
+              </a:tr>
+              <a:tr h="597585">
+                <a:tc vMerge="1">
+                  <a:txBody>
+                    <a:bodyPr/>
+                    <a:lstStyle/>
+                    <a:p>
+                      <a:endParaRPr lang="en-US" dirty="0"/>
+                    </a:p>
+                  </a:txBody>
+                  <a:tcPr/>
+                </a:tc>
+                <a:tc vMerge="1">
+                  <a:txBody>
+                    <a:bodyPr/>
+                    <a:lstStyle/>
+                    <a:p>
+                      <a:endParaRPr lang="en-US" dirty="0"/>
+                    </a:p>
+                  </a:txBody>
+                  <a:tcPr/>
+                </a:tc>
+                <a:tc>
+                  <a:txBody>
+                    <a:bodyPr/>
+                    <a:lstStyle/>
+                    <a:p>
+                      <a:r>
+                        <a:rPr lang="en-US" dirty="0" smtClean="0"/>
+                        <a:t>CDP + SRM</a:t>
+                      </a:r>
+                      <a:endParaRPr lang="en-US" dirty="0"/>
+                    </a:p>
+                  </a:txBody>
+                  <a:tcPr/>
+                </a:tc>
+                <a:tc>
+                  <a:txBody>
+                    <a:bodyPr/>
+                    <a:lstStyle/>
+                    <a:p>
+                      <a:r>
+                        <a:rPr lang="en-US" dirty="0" smtClean="0"/>
+                        <a:t>Site level sync</a:t>
+                      </a:r>
+                      <a:r>
+                        <a:rPr lang="en-US" baseline="0" dirty="0" smtClean="0"/>
+                        <a:t> r</a:t>
+                      </a:r>
+                      <a:r>
+                        <a:rPr lang="en-US" dirty="0" smtClean="0"/>
+                        <a:t>eplication</a:t>
+                      </a:r>
+                    </a:p>
+                    <a:p>
+                      <a:r>
+                        <a:rPr lang="en-US" dirty="0" smtClean="0"/>
+                        <a:t>Disaster Recovery orchestration</a:t>
+                      </a:r>
+                      <a:r>
+                        <a:rPr lang="en-US" baseline="0" dirty="0" smtClean="0"/>
+                        <a:t> </a:t>
+                      </a:r>
+                      <a:r>
+                        <a:rPr lang="en-US" baseline="0" dirty="0" smtClean="0"/>
+                        <a:t>&amp; </a:t>
+                      </a:r>
+                      <a:r>
+                        <a:rPr lang="en-US" baseline="0" dirty="0" smtClean="0"/>
+                        <a:t>automation</a:t>
+                      </a:r>
+                      <a:endParaRPr lang="en-US" dirty="0"/>
+                    </a:p>
+                  </a:txBody>
+                  <a:tcPr/>
+                </a:tc>
+              </a:tr>
+              <a:tr h="597585">
+                <a:tc>
+                  <a:txBody>
+                    <a:bodyPr/>
+                    <a:lstStyle/>
+                    <a:p>
+                      <a:pPr marL="0" marR="0" indent="0" algn="l" defTabSz="914400" rtl="0" eaLnBrk="1" fontAlgn="auto" latinLnBrk="0" hangingPunct="1">
+                        <a:lnSpc>
+                          <a:spcPct val="100000"/>
+                        </a:lnSpc>
+                        <a:spcBef>
+                          <a:spcPts val="0"/>
+                        </a:spcBef>
+                        <a:spcAft>
+                          <a:spcPts val="0"/>
+                        </a:spcAft>
+                        <a:buClrTx/>
+                        <a:buSzTx/>
+                        <a:buFontTx/>
+                        <a:buNone/>
+                        <a:tabLst/>
+                        <a:defRPr/>
+                      </a:pPr>
+                      <a:r>
+                        <a:rPr lang="en-US" dirty="0" smtClean="0"/>
+                        <a:t>Minutes</a:t>
+                      </a:r>
+                    </a:p>
+                    <a:p>
+                      <a:endParaRPr lang="en-US" dirty="0"/>
+                    </a:p>
+                  </a:txBody>
+                  <a:tcPr/>
+                </a:tc>
+                <a:tc>
+                  <a:txBody>
+                    <a:bodyPr/>
+                    <a:lstStyle/>
+                    <a:p>
+                      <a:pPr marL="0" marR="0" indent="0" algn="l" defTabSz="914400" rtl="0" eaLnBrk="1" fontAlgn="auto" latinLnBrk="0" hangingPunct="1">
+                        <a:lnSpc>
+                          <a:spcPct val="100000"/>
+                        </a:lnSpc>
+                        <a:spcBef>
+                          <a:spcPts val="0"/>
+                        </a:spcBef>
+                        <a:spcAft>
+                          <a:spcPts val="0"/>
+                        </a:spcAft>
+                        <a:buClrTx/>
+                        <a:buSzTx/>
+                        <a:buFontTx/>
+                        <a:buNone/>
+                        <a:tabLst/>
+                        <a:defRPr/>
+                      </a:pPr>
+                      <a:r>
+                        <a:rPr lang="en-US" dirty="0" smtClean="0"/>
+                        <a:t>Minutes</a:t>
+                      </a:r>
+                    </a:p>
+                    <a:p>
+                      <a:endParaRPr lang="en-US" dirty="0"/>
+                    </a:p>
+                  </a:txBody>
+                  <a:tcPr/>
+                </a:tc>
+                <a:tc>
+                  <a:txBody>
+                    <a:bodyPr/>
+                    <a:lstStyle/>
+                    <a:p>
+                      <a:r>
+                        <a:rPr lang="en-US" dirty="0" smtClean="0"/>
+                        <a:t>Near</a:t>
+                      </a:r>
+                      <a:r>
+                        <a:rPr lang="en-US" baseline="0" dirty="0" smtClean="0"/>
+                        <a:t> CDP</a:t>
+                      </a:r>
+                    </a:p>
+                    <a:p>
+                      <a:r>
+                        <a:rPr lang="en-US" baseline="0" dirty="0" smtClean="0"/>
+                        <a:t>or CRR</a:t>
+                      </a:r>
+                      <a:endParaRPr lang="en-US" dirty="0"/>
+                    </a:p>
+                  </a:txBody>
+                  <a:tcPr/>
+                </a:tc>
+                <a:tc>
+                  <a:txBody>
+                    <a:bodyPr/>
+                    <a:lstStyle/>
+                    <a:p>
+                      <a:r>
+                        <a:rPr lang="en-US" dirty="0" smtClean="0"/>
+                        <a:t>VM Replication &amp; Backup</a:t>
+                      </a:r>
+                      <a:endParaRPr lang="en-US" dirty="0"/>
+                    </a:p>
+                  </a:txBody>
+                  <a:tcPr/>
+                </a:tc>
+              </a:tr>
+              <a:tr h="597585">
+                <a:tc>
+                  <a:txBody>
+                    <a:bodyPr/>
+                    <a:lstStyle/>
+                    <a:p>
+                      <a:r>
+                        <a:rPr lang="en-US" dirty="0" smtClean="0"/>
+                        <a:t>Hours</a:t>
+                      </a:r>
+                      <a:endParaRPr lang="en-US" dirty="0"/>
+                    </a:p>
+                  </a:txBody>
+                  <a:tcPr/>
+                </a:tc>
+                <a:tc>
+                  <a:txBody>
+                    <a:bodyPr/>
+                    <a:lstStyle/>
+                    <a:p>
+                      <a:r>
+                        <a:rPr lang="en-US" dirty="0" smtClean="0"/>
+                        <a:t>Minutes</a:t>
+                      </a:r>
+                      <a:endParaRPr lang="en-US" dirty="0"/>
+                    </a:p>
+                  </a:txBody>
+                  <a:tcPr/>
+                </a:tc>
+                <a:tc>
+                  <a:txBody>
+                    <a:bodyPr/>
+                    <a:lstStyle/>
+                    <a:p>
+                      <a:r>
+                        <a:rPr lang="en-US" dirty="0" smtClean="0"/>
+                        <a:t>Backup</a:t>
+                      </a:r>
+                      <a:endParaRPr lang="en-US" baseline="0" dirty="0" smtClean="0"/>
+                    </a:p>
+                    <a:p>
+                      <a:r>
+                        <a:rPr lang="en-US" baseline="0" dirty="0" smtClean="0"/>
+                        <a:t>or Replication</a:t>
+                      </a:r>
+                      <a:endParaRPr lang="en-US" dirty="0"/>
+                    </a:p>
+                  </a:txBody>
+                  <a:tcPr/>
+                </a:tc>
+                <a:tc>
+                  <a:txBody>
+                    <a:bodyPr/>
+                    <a:lstStyle/>
+                    <a:p>
+                      <a:r>
+                        <a:rPr lang="en-US" dirty="0" smtClean="0"/>
+                        <a:t>VM Replication &amp; Backup</a:t>
+                      </a:r>
+                    </a:p>
+                    <a:p>
+                      <a:r>
+                        <a:rPr lang="en-US" baseline="0" dirty="0" smtClean="0"/>
+                        <a:t>Traditional backup &amp; restore</a:t>
+                      </a:r>
+                      <a:endParaRPr lang="en-US" dirty="0"/>
+                    </a:p>
+                  </a:txBody>
+                  <a:tcPr/>
+                </a:tc>
+              </a:tr>
+              <a:tr h="853693">
+                <a:tc>
+                  <a:txBody>
+                    <a:bodyPr/>
+                    <a:lstStyle/>
+                    <a:p>
+                      <a:r>
+                        <a:rPr lang="en-US" dirty="0" smtClean="0"/>
+                        <a:t>Hours</a:t>
+                      </a:r>
+                      <a:endParaRPr lang="en-US" dirty="0"/>
+                    </a:p>
+                  </a:txBody>
+                  <a:tcPr/>
+                </a:tc>
+                <a:tc>
+                  <a:txBody>
+                    <a:bodyPr/>
+                    <a:lstStyle/>
+                    <a:p>
+                      <a:r>
+                        <a:rPr lang="en-US" dirty="0" smtClean="0"/>
+                        <a:t>Hours</a:t>
+                      </a:r>
+                      <a:endParaRPr lang="en-US" dirty="0"/>
+                    </a:p>
+                  </a:txBody>
+                  <a:tcPr/>
+                </a:tc>
+                <a:tc>
+                  <a:txBody>
+                    <a:bodyPr/>
+                    <a:lstStyle/>
+                    <a:p>
+                      <a:r>
+                        <a:rPr lang="en-US" dirty="0" smtClean="0"/>
+                        <a:t>Backup</a:t>
+                      </a:r>
+                    </a:p>
+                    <a:p>
+                      <a:r>
+                        <a:rPr lang="en-US" dirty="0" smtClean="0"/>
+                        <a:t>or</a:t>
+                      </a:r>
+                      <a:r>
+                        <a:rPr lang="en-US" baseline="0" dirty="0" smtClean="0"/>
+                        <a:t> Replication</a:t>
+                      </a:r>
+                      <a:endParaRPr lang="en-US" dirty="0"/>
+                    </a:p>
+                  </a:txBody>
+                  <a:tcPr/>
+                </a:tc>
+                <a:tc>
+                  <a:txBody>
+                    <a:bodyPr/>
+                    <a:lstStyle/>
+                    <a:p>
+                      <a:r>
+                        <a:rPr lang="en-US" dirty="0" smtClean="0"/>
+                        <a:t>VM Replication &amp; Backup</a:t>
+                      </a:r>
+                    </a:p>
+                    <a:p>
+                      <a:r>
+                        <a:rPr lang="en-US" baseline="0" dirty="0" smtClean="0"/>
+                        <a:t>Traditional backup &amp; restore</a:t>
+                      </a:r>
+                    </a:p>
+                    <a:p>
+                      <a:pPr marL="0" marR="0" indent="0" algn="l" defTabSz="914400" rtl="0" eaLnBrk="1" fontAlgn="auto" latinLnBrk="0" hangingPunct="1">
+                        <a:lnSpc>
+                          <a:spcPct val="100000"/>
+                        </a:lnSpc>
+                        <a:spcBef>
+                          <a:spcPts val="0"/>
+                        </a:spcBef>
+                        <a:spcAft>
+                          <a:spcPts val="0"/>
+                        </a:spcAft>
+                        <a:buClrTx/>
+                        <a:buSzTx/>
+                        <a:buFontTx/>
+                        <a:buNone/>
+                        <a:tabLst/>
+                        <a:defRPr/>
+                      </a:pPr>
+                      <a:r>
+                        <a:rPr lang="en-US" baseline="0" dirty="0" smtClean="0"/>
+                        <a:t>Cloud backup &amp; restore</a:t>
+                      </a:r>
+                    </a:p>
+                  </a:txBody>
+                  <a:tcPr/>
+                </a:tc>
+              </a:tr>
+            </a:tbl>
+          </a:graphicData>
+        </a:graphic>
+      </p:graphicFrame>
+    </p:spTree>
+    <p:extLst>
+      <p:ext uri="{BB962C8B-B14F-4D97-AF65-F5344CB8AC3E}">
+        <p14:creationId xmlns:p14="http://schemas.microsoft.com/office/powerpoint/2010/main" val="2350631887"/>
+      </p:ext>
+    </p:extLst>
+  </p:cSld>
+  <p:clrMapOvr>
+    <a:masterClrMapping/>
+  </p:clrMapOvr>
+</p:sld>
+</file>
+
+<file path=ppt/slides/slide14.xml><?xml version="1.0" encoding="utf-8"?>
+<p:sld xmlns:a="http://schemas.openxmlformats.org/drawingml/2006/main" xmlns:r="http://schemas.openxmlformats.org/officeDocument/2006/relationships" xmlns:p="http://schemas.openxmlformats.org/presentationml/2006/main">
+  <p:cSld>
+    <p:spTree>
+      <p:nvGrpSpPr>
+        <p:cNvPr id="1" name=""/>
+        <p:cNvGrpSpPr/>
+        <p:nvPr/>
+      </p:nvGrpSpPr>
+      <p:grpSpPr>
+        <a:xfrm>
+          <a:off x="0" y="0"/>
+          <a:ext cx="0" cy="0"/>
+          <a:chOff x="0" y="0"/>
+          <a:chExt cx="0" cy="0"/>
+        </a:xfrm>
+      </p:grpSpPr>
+      <p:sp>
+        <p:nvSpPr>
+          <p:cNvPr id="2" name="Title 1"/>
+          <p:cNvSpPr>
+            <a:spLocks noGrp="1"/>
+          </p:cNvSpPr>
+          <p:nvPr>
+            <p:ph type="title"/>
+          </p:nvPr>
+        </p:nvSpPr>
+        <p:spPr/>
+        <p:txBody>
           <a:bodyPr>
             <a:normAutofit fontScale="90000"/>
           </a:bodyPr>
@@ -8519,7 +9089,15 @@
           <a:p>
             <a:r>
               <a:rPr lang="en-US" dirty="0" smtClean="0"/>
-              <a:t>Use Case: VM Replication &amp; Backup</a:t>
+              <a:t>Use Case: </a:t>
+            </a:r>
+            <a:r>
+              <a:rPr lang="en-US" dirty="0" smtClean="0"/>
+              <a:t>VM Replication </a:t>
+            </a:r>
+            <a:r>
+              <a:rPr lang="en-US" dirty="0" smtClean="0"/>
+              <a:t>&amp; Backup</a:t>
             </a:r>
             <a:endParaRPr lang="en-US" dirty="0"/>
           </a:p>
@@ -8592,7 +9170,7 @@
 </p:sld>
 </file>
 
-<file path=ppt/slides/slide14.xml><?xml version="1.0" encoding="utf-8"?>
+<file path=ppt/slides/slide15.xml><?xml version="1.0" encoding="utf-8"?>
 <p:sld xmlns:a="http://schemas.openxmlformats.org/drawingml/2006/main" xmlns:r="http://schemas.openxmlformats.org/officeDocument/2006/relationships" xmlns:p="http://schemas.openxmlformats.org/presentationml/2006/main">
   <p:cSld>
     <p:spTree>
@@ -8713,7 +9291,7 @@
 </p:sld>
 </file>
 
-<file path=ppt/slides/slide15.xml><?xml version="1.0" encoding="utf-8"?>
+<file path=ppt/slides/slide16.xml><?xml version="1.0" encoding="utf-8"?>
 <p:sld xmlns:a="http://schemas.openxmlformats.org/drawingml/2006/main" xmlns:r="http://schemas.openxmlformats.org/officeDocument/2006/relationships" xmlns:p="http://schemas.openxmlformats.org/presentationml/2006/main">
   <p:cSld>
     <p:spTree>
@@ -8830,7 +9408,7 @@
 </p:sld>
 </file>
 
-<file path=ppt/slides/slide16.xml><?xml version="1.0" encoding="utf-8"?>
+<file path=ppt/slides/slide17.xml><?xml version="1.0" encoding="utf-8"?>
 <p:sld xmlns:a="http://schemas.openxmlformats.org/drawingml/2006/main" xmlns:r="http://schemas.openxmlformats.org/officeDocument/2006/relationships" xmlns:p="http://schemas.openxmlformats.org/presentationml/2006/main">
   <p:cSld>
     <p:spTree>
@@ -8949,7 +9527,7 @@
 </p:sld>
 </file>
 
-<file path=ppt/slides/slide17.xml><?xml version="1.0" encoding="utf-8"?>
+<file path=ppt/slides/slide18.xml><?xml version="1.0" encoding="utf-8"?>
 <p:sld xmlns:a="http://schemas.openxmlformats.org/drawingml/2006/main" xmlns:r="http://schemas.openxmlformats.org/officeDocument/2006/relationships" xmlns:p="http://schemas.openxmlformats.org/presentationml/2006/main">
   <p:cSld>
     <p:spTree>
@@ -8983,7 +9561,11 @@
           <a:p>
             <a:r>
               <a:rPr lang="en-US" dirty="0" smtClean="0"/>
-              <a:t>Gen3: VADP Physical Proxy</a:t>
+              <a:t>Gen3A: </a:t>
+            </a:r>
+            <a:r>
+              <a:rPr lang="en-US" dirty="0" smtClean="0"/>
+              <a:t>VADP Physical Proxy</a:t>
             </a:r>
             <a:endParaRPr lang="en-US" dirty="0"/>
           </a:p>
@@ -9154,7 +9736,7 @@
 </p:sld>
 </file>
 
-<file path=ppt/slides/slide18.xml><?xml version="1.0" encoding="utf-8"?>
+<file path=ppt/slides/slide19.xml><?xml version="1.0" encoding="utf-8"?>
 <p:sld xmlns:a="http://schemas.openxmlformats.org/drawingml/2006/main" xmlns:r="http://schemas.openxmlformats.org/officeDocument/2006/relationships" xmlns:p="http://schemas.openxmlformats.org/presentationml/2006/main">
   <p:cSld>
     <p:spTree>
@@ -9188,7 +9770,11 @@
           <a:p>
             <a:r>
               <a:rPr lang="en-US" dirty="0" smtClean="0"/>
-              <a:t>Gen3: VADP VM Appliance</a:t>
+              <a:t>Gen3B: </a:t>
+            </a:r>
+            <a:r>
+              <a:rPr lang="en-US" dirty="0" smtClean="0"/>
+              <a:t>VADP VM Appliance</a:t>
             </a:r>
             <a:endParaRPr lang="en-US" dirty="0"/>
           </a:p>
@@ -9359,7 +9945,122 @@
 </p:sld>
 </file>
 
-<file path=ppt/slides/slide19.xml><?xml version="1.0" encoding="utf-8"?>
+<file path=ppt/slides/slide2.xml><?xml version="1.0" encoding="utf-8"?>
+<p:sld xmlns:a="http://schemas.openxmlformats.org/drawingml/2006/main" xmlns:r="http://schemas.openxmlformats.org/officeDocument/2006/relationships" xmlns:p="http://schemas.openxmlformats.org/presentationml/2006/main">
+  <p:cSld>
+    <p:spTree>
+      <p:nvGrpSpPr>
+        <p:cNvPr id="1" name=""/>
+        <p:cNvGrpSpPr/>
+        <p:nvPr/>
+      </p:nvGrpSpPr>
+      <p:grpSpPr>
+        <a:xfrm>
+          <a:off x="0" y="0"/>
+          <a:ext cx="0" cy="0"/>
+          <a:chOff x="0" y="0"/>
+          <a:chExt cx="0" cy="0"/>
+        </a:xfrm>
+      </p:grpSpPr>
+      <p:sp>
+        <p:nvSpPr>
+          <p:cNvPr id="2" name="Title 1"/>
+          <p:cNvSpPr>
+            <a:spLocks noGrp="1"/>
+          </p:cNvSpPr>
+          <p:nvPr>
+            <p:ph type="title"/>
+          </p:nvPr>
+        </p:nvSpPr>
+        <p:spPr/>
+        <p:txBody>
+          <a:bodyPr/>
+          <a:lstStyle/>
+          <a:p>
+            <a:r>
+              <a:rPr lang="en-US" dirty="0" smtClean="0"/>
+              <a:t>Agenda</a:t>
+            </a:r>
+            <a:endParaRPr lang="en-US" dirty="0"/>
+          </a:p>
+        </p:txBody>
+      </p:sp>
+      <p:sp>
+        <p:nvSpPr>
+          <p:cNvPr id="3" name="Content Placeholder 2"/>
+          <p:cNvSpPr>
+            <a:spLocks noGrp="1"/>
+          </p:cNvSpPr>
+          <p:nvPr>
+            <p:ph sz="quarter" idx="1"/>
+          </p:nvPr>
+        </p:nvSpPr>
+        <p:spPr/>
+        <p:txBody>
+          <a:bodyPr/>
+          <a:lstStyle/>
+          <a:p>
+            <a:r>
+              <a:rPr lang="en-US" dirty="0">
+                <a:solidFill>
+                  <a:srgbClr val="FF0000"/>
+                </a:solidFill>
+              </a:rPr>
+              <a:t>Backup concepts</a:t>
+            </a:r>
+          </a:p>
+          <a:p>
+            <a:r>
+              <a:rPr lang="en-US" dirty="0" smtClean="0"/>
+              <a:t>Traditional Backup Pain Points</a:t>
+            </a:r>
+          </a:p>
+          <a:p>
+            <a:r>
+              <a:rPr lang="en-US" dirty="0" smtClean="0"/>
+              <a:t>VM Backup Use </a:t>
+            </a:r>
+            <a:r>
+              <a:rPr lang="en-US" dirty="0"/>
+              <a:t>C</a:t>
+            </a:r>
+            <a:r>
+              <a:rPr lang="en-US" dirty="0" smtClean="0"/>
+              <a:t>ases</a:t>
+            </a:r>
+          </a:p>
+          <a:p>
+            <a:r>
+              <a:rPr lang="en-US" dirty="0" smtClean="0"/>
+              <a:t>Market Analysis</a:t>
+            </a:r>
+          </a:p>
+          <a:p>
+            <a:endParaRPr lang="en-US" dirty="0"/>
+          </a:p>
+        </p:txBody>
+      </p:sp>
+    </p:spTree>
+    <p:extLst>
+      <p:ext uri="{BB962C8B-B14F-4D97-AF65-F5344CB8AC3E}">
+        <p14:creationId xmlns:p14="http://schemas.microsoft.com/office/powerpoint/2010/main" val="643932283"/>
+      </p:ext>
+    </p:extLst>
+  </p:cSld>
+  <p:clrMapOvr>
+    <a:masterClrMapping/>
+  </p:clrMapOvr>
+  <p:timing>
+    <p:tnLst>
+      <p:par>
+        <p:cTn id="1" dur="indefinite" restart="never" nodeType="tmRoot"/>
+      </p:par>
+    </p:tnLst>
+  </p:timing>
+</p:sld>
+</file>
+
+<file path=ppt/slides/slide20.xml><?xml version="1.0" encoding="utf-8"?>
 <p:sld xmlns:a="http://schemas.openxmlformats.org/drawingml/2006/main" xmlns:r="http://schemas.openxmlformats.org/officeDocument/2006/relationships" xmlns:p="http://schemas.openxmlformats.org/presentationml/2006/main">
   <p:cSld>
     <p:spTree>
@@ -9523,7 +10224,7 @@
 </p:sld>
 </file>
 
-<file path=ppt/slides/slide2.xml><?xml version="1.0" encoding="utf-8"?>
+<file path=ppt/slides/slide21.xml><?xml version="1.0" encoding="utf-8"?>
 <p:sld xmlns:a="http://schemas.openxmlformats.org/drawingml/2006/main" xmlns:r="http://schemas.openxmlformats.org/officeDocument/2006/relationships" xmlns:p="http://schemas.openxmlformats.org/presentationml/2006/main">
   <p:cSld>
     <p:spTree>
@@ -9552,121 +10253,6 @@
         </p:nvSpPr>
         <p:spPr/>
         <p:txBody>
-          <a:bodyPr/>
-          <a:lstStyle/>
-          <a:p>
-            <a:r>
-              <a:rPr lang="en-US" dirty="0" smtClean="0"/>
-              <a:t>Agenda</a:t>
-            </a:r>
-            <a:endParaRPr lang="en-US" dirty="0"/>
-          </a:p>
-        </p:txBody>
-      </p:sp>
-      <p:sp>
-        <p:nvSpPr>
-          <p:cNvPr id="3" name="Content Placeholder 2"/>
-          <p:cNvSpPr>
-            <a:spLocks noGrp="1"/>
-          </p:cNvSpPr>
-          <p:nvPr>
-            <p:ph sz="quarter" idx="1"/>
-          </p:nvPr>
-        </p:nvSpPr>
-        <p:spPr/>
-        <p:txBody>
-          <a:bodyPr/>
-          <a:lstStyle/>
-          <a:p>
-            <a:r>
-              <a:rPr lang="en-US" dirty="0">
-                <a:solidFill>
-                  <a:srgbClr val="FF0000"/>
-                </a:solidFill>
-              </a:rPr>
-              <a:t>Backup concepts</a:t>
-            </a:r>
-          </a:p>
-          <a:p>
-            <a:r>
-              <a:rPr lang="en-US" dirty="0" smtClean="0"/>
-              <a:t>Traditional Backup Pain Points</a:t>
-            </a:r>
-          </a:p>
-          <a:p>
-            <a:r>
-              <a:rPr lang="en-US" dirty="0" smtClean="0"/>
-              <a:t>VM Backup Use </a:t>
-            </a:r>
-            <a:r>
-              <a:rPr lang="en-US" dirty="0"/>
-              <a:t>C</a:t>
-            </a:r>
-            <a:r>
-              <a:rPr lang="en-US" dirty="0" smtClean="0"/>
-              <a:t>ases</a:t>
-            </a:r>
-          </a:p>
-          <a:p>
-            <a:r>
-              <a:rPr lang="en-US" dirty="0" smtClean="0"/>
-              <a:t>Market Analysis</a:t>
-            </a:r>
-          </a:p>
-          <a:p>
-            <a:endParaRPr lang="en-US" dirty="0"/>
-          </a:p>
-        </p:txBody>
-      </p:sp>
-    </p:spTree>
-    <p:extLst>
-      <p:ext uri="{BB962C8B-B14F-4D97-AF65-F5344CB8AC3E}">
-        <p14:creationId xmlns:p14="http://schemas.microsoft.com/office/powerpoint/2010/main" val="643932283"/>
-      </p:ext>
-    </p:extLst>
-  </p:cSld>
-  <p:clrMapOvr>
-    <a:masterClrMapping/>
-  </p:clrMapOvr>
-  <p:timing>
-    <p:tnLst>
-      <p:par>
-        <p:cTn id="1" dur="indefinite" restart="never" nodeType="tmRoot"/>
-      </p:par>
-    </p:tnLst>
-  </p:timing>
-</p:sld>
-</file>
-
-<file path=ppt/slides/slide20.xml><?xml version="1.0" encoding="utf-8"?>
-<p:sld xmlns:a="http://schemas.openxmlformats.org/drawingml/2006/main" xmlns:r="http://schemas.openxmlformats.org/officeDocument/2006/relationships" xmlns:p="http://schemas.openxmlformats.org/presentationml/2006/main">
-  <p:cSld>
-    <p:spTree>
-      <p:nvGrpSpPr>
-        <p:cNvPr id="1" name=""/>
-        <p:cNvGrpSpPr/>
-        <p:nvPr/>
-      </p:nvGrpSpPr>
-      <p:grpSpPr>
-        <a:xfrm>
-          <a:off x="0" y="0"/>
-          <a:ext cx="0" cy="0"/>
-          <a:chOff x="0" y="0"/>
-          <a:chExt cx="0" cy="0"/>
-        </a:xfrm>
-      </p:grpSpPr>
-      <p:sp>
-        <p:nvSpPr>
-          <p:cNvPr id="2" name="Title 1"/>
-          <p:cNvSpPr>
-            <a:spLocks noGrp="1"/>
-          </p:cNvSpPr>
-          <p:nvPr>
-            <p:ph type="title"/>
-          </p:nvPr>
-        </p:nvSpPr>
-        <p:spPr/>
-        <p:txBody>
           <a:bodyPr>
             <a:normAutofit/>
           </a:bodyPr>
@@ -9921,7 +10507,7 @@
 </p:sld>
 </file>
 
-<file path=ppt/slides/slide21.xml><?xml version="1.0" encoding="utf-8"?>
+<file path=ppt/slides/slide22.xml><?xml version="1.0" encoding="utf-8"?>
 <p:sld xmlns:a="http://schemas.openxmlformats.org/drawingml/2006/main" xmlns:r="http://schemas.openxmlformats.org/officeDocument/2006/relationships" xmlns:p="http://schemas.openxmlformats.org/presentationml/2006/main">
   <p:cSld>
     <p:spTree>
@@ -10028,270 +10614,6 @@
 </p:sld>
 </file>
 
-<file path=ppt/slides/slide22.xml><?xml version="1.0" encoding="utf-8"?>
-<p:sld xmlns:a="http://schemas.openxmlformats.org/drawingml/2006/main" xmlns:r="http://schemas.openxmlformats.org/officeDocument/2006/relationships" xmlns:p="http://schemas.openxmlformats.org/presentationml/2006/main">
-  <p:cSld>
-    <p:spTree>
-      <p:nvGrpSpPr>
-        <p:cNvPr id="1" name=""/>
-        <p:cNvGrpSpPr/>
-        <p:nvPr/>
-      </p:nvGrpSpPr>
-      <p:grpSpPr>
-        <a:xfrm>
-          <a:off x="0" y="0"/>
-          <a:ext cx="0" cy="0"/>
-          <a:chOff x="0" y="0"/>
-          <a:chExt cx="0" cy="0"/>
-        </a:xfrm>
-      </p:grpSpPr>
-      <p:sp>
-        <p:nvSpPr>
-          <p:cNvPr id="2" name="Title 1"/>
-          <p:cNvSpPr>
-            <a:spLocks noGrp="1"/>
-          </p:cNvSpPr>
-          <p:nvPr>
-            <p:ph type="title"/>
-          </p:nvPr>
-        </p:nvSpPr>
-        <p:spPr/>
-        <p:txBody>
-          <a:bodyPr>
-            <a:normAutofit/>
-          </a:bodyPr>
-          <a:lstStyle/>
-          <a:p>
-            <a:r>
-              <a:rPr lang="en-US" dirty="0" smtClean="0"/>
-              <a:t>Veeam Features For VM Restore</a:t>
-            </a:r>
-            <a:endParaRPr lang="en-US" dirty="0"/>
-          </a:p>
-        </p:txBody>
-      </p:sp>
-      <p:sp>
-        <p:nvSpPr>
-          <p:cNvPr id="3" name="Content Placeholder 2"/>
-          <p:cNvSpPr>
-            <a:spLocks noGrp="1"/>
-          </p:cNvSpPr>
-          <p:nvPr>
-            <p:ph sz="quarter" idx="1"/>
-          </p:nvPr>
-        </p:nvSpPr>
-        <p:spPr>
-          <a:xfrm>
-            <a:off x="612648" y="1600200"/>
-            <a:ext cx="8302752" cy="4832866"/>
-          </a:xfrm>
-        </p:spPr>
-        <p:txBody>
-          <a:bodyPr>
-            <a:normAutofit fontScale="77500" lnSpcReduction="20000"/>
-          </a:bodyPr>
-          <a:lstStyle/>
-          <a:p>
-            <a:r>
-              <a:rPr lang="en-US" dirty="0" smtClean="0"/>
-              <a:t>Easier and quick restore</a:t>
-            </a:r>
-          </a:p>
-          <a:p>
-            <a:pPr lvl="1"/>
-            <a:r>
-              <a:rPr lang="en-US" dirty="0" smtClean="0">
-                <a:solidFill>
-                  <a:srgbClr val="FF0000"/>
-                </a:solidFill>
-              </a:rPr>
-              <a:t>1 click restore with a single or group VMs</a:t>
-            </a:r>
-          </a:p>
-          <a:p>
-            <a:r>
-              <a:rPr lang="en-US" dirty="0" smtClean="0"/>
-              <a:t>Easier test and verify backup</a:t>
-            </a:r>
-          </a:p>
-          <a:p>
-            <a:pPr lvl="1"/>
-            <a:r>
-              <a:rPr lang="en-US" dirty="0" smtClean="0">
-                <a:solidFill>
-                  <a:srgbClr val="FF0000"/>
-                </a:solidFill>
-              </a:rPr>
-              <a:t>Automatic verification</a:t>
-            </a:r>
-          </a:p>
-          <a:p>
-            <a:pPr lvl="1"/>
-            <a:r>
-              <a:rPr lang="en-US" dirty="0" smtClean="0">
-                <a:solidFill>
-                  <a:srgbClr val="FF0000"/>
-                </a:solidFill>
-              </a:rPr>
-              <a:t>On demand sandbox vs. dedicate virtual lab</a:t>
-            </a:r>
-          </a:p>
-          <a:p>
-            <a:r>
-              <a:rPr lang="en-US" dirty="0" smtClean="0"/>
-              <a:t>High backup usability</a:t>
-            </a:r>
-          </a:p>
-          <a:p>
-            <a:pPr lvl="1"/>
-            <a:r>
-              <a:rPr lang="en-US" dirty="0" smtClean="0"/>
-              <a:t>Instant </a:t>
-            </a:r>
-            <a:r>
-              <a:rPr lang="en-US" dirty="0"/>
-              <a:t>recover + Storage </a:t>
-            </a:r>
-            <a:r>
-              <a:rPr lang="en-US" dirty="0" err="1"/>
-              <a:t>vMotion</a:t>
-            </a:r>
-            <a:endParaRPr lang="en-US" dirty="0"/>
-          </a:p>
-          <a:p>
-            <a:r>
-              <a:rPr lang="en-US" dirty="0" smtClean="0"/>
-              <a:t>Fine granularity restore based on one method</a:t>
-            </a:r>
-          </a:p>
-          <a:p>
-            <a:pPr lvl="1"/>
-            <a:r>
-              <a:rPr lang="en-US" dirty="0" smtClean="0"/>
-              <a:t>Image level restore</a:t>
-            </a:r>
-          </a:p>
-          <a:p>
-            <a:pPr lvl="2"/>
-            <a:r>
-              <a:rPr lang="en-US" dirty="0" smtClean="0"/>
-              <a:t>Full or incremental VM recovery with efficient VM search</a:t>
-            </a:r>
-          </a:p>
-          <a:p>
-            <a:pPr lvl="1"/>
-            <a:r>
-              <a:rPr lang="en-US" dirty="0" smtClean="0"/>
-              <a:t>File level restore</a:t>
-            </a:r>
-          </a:p>
-          <a:p>
-            <a:pPr lvl="2"/>
-            <a:r>
-              <a:rPr lang="en-US" dirty="0"/>
-              <a:t>File instant index and </a:t>
-            </a:r>
-            <a:r>
-              <a:rPr lang="en-US" dirty="0" smtClean="0"/>
-              <a:t>search</a:t>
-            </a:r>
-            <a:endParaRPr lang="en-US" dirty="0" smtClean="0">
-              <a:solidFill>
-                <a:srgbClr val="FF0000"/>
-              </a:solidFill>
-            </a:endParaRPr>
-          </a:p>
-          <a:p>
-            <a:pPr lvl="2"/>
-            <a:r>
-              <a:rPr lang="en-US" dirty="0" smtClean="0">
-                <a:solidFill>
-                  <a:srgbClr val="FF0000"/>
-                </a:solidFill>
-              </a:rPr>
-              <a:t>Explorer for any type of file systems per VM images</a:t>
-            </a:r>
-            <a:endParaRPr lang="en-US" dirty="0" smtClean="0"/>
-          </a:p>
-          <a:p>
-            <a:pPr lvl="1"/>
-            <a:r>
-              <a:rPr lang="en-US" dirty="0" smtClean="0"/>
-              <a:t>Application level restore</a:t>
-            </a:r>
-          </a:p>
-          <a:p>
-            <a:pPr lvl="2"/>
-            <a:r>
-              <a:rPr lang="en-US" dirty="0" smtClean="0">
-                <a:solidFill>
-                  <a:srgbClr val="FF0000"/>
-                </a:solidFill>
-              </a:rPr>
-              <a:t>RDB table &amp; records, Exchange mail items, Active Directory</a:t>
-            </a:r>
-            <a:r>
-              <a:rPr lang="en-US" dirty="0" smtClean="0"/>
-              <a:t> etc…</a:t>
-            </a:r>
-          </a:p>
-        </p:txBody>
-      </p:sp>
-      <p:sp>
-        <p:nvSpPr>
-          <p:cNvPr id="4" name="TextBox 3"/>
-          <p:cNvSpPr txBox="1"/>
-          <p:nvPr/>
-        </p:nvSpPr>
-        <p:spPr>
-          <a:xfrm>
-            <a:off x="533400" y="6471022"/>
-            <a:ext cx="7162800" cy="369332"/>
-          </a:xfrm>
-          <a:prstGeom prst="rect">
-            <a:avLst/>
-          </a:prstGeom>
-          <a:noFill/>
-        </p:spPr>
-        <p:txBody>
-          <a:bodyPr wrap="square" rtlCol="0">
-            <a:spAutoFit/>
-          </a:bodyPr>
-          <a:lstStyle/>
-          <a:p>
-            <a:r>
-              <a:rPr lang="en-US" dirty="0" smtClean="0"/>
-              <a:t>Note:  </a:t>
-            </a:r>
-            <a:r>
-              <a:rPr lang="en-US" dirty="0" smtClean="0">
-                <a:solidFill>
-                  <a:srgbClr val="FF0000"/>
-                </a:solidFill>
-              </a:rPr>
-              <a:t>Red color </a:t>
-            </a:r>
-            <a:r>
-              <a:rPr lang="en-US" dirty="0" smtClean="0"/>
-              <a:t>indicates Veeam strengths over other VM backup products</a:t>
-            </a:r>
-            <a:endParaRPr lang="en-US" dirty="0"/>
-          </a:p>
-        </p:txBody>
-      </p:sp>
-    </p:spTree>
-    <p:extLst>
-      <p:ext uri="{BB962C8B-B14F-4D97-AF65-F5344CB8AC3E}">
-        <p14:creationId xmlns:p14="http://schemas.microsoft.com/office/powerpoint/2010/main" val="2338376958"/>
-      </p:ext>
-    </p:extLst>
-  </p:cSld>
-  <p:clrMapOvr>
-    <a:masterClrMapping/>
-  </p:clrMapOvr>
-</p:sld>
-</file>
-
 <file path=ppt/slides/slide23.xml><?xml version="1.0" encoding="utf-8"?>
 <p:sld xmlns:a="http://schemas.openxmlformats.org/drawingml/2006/main" xmlns:r="http://schemas.openxmlformats.org/officeDocument/2006/relationships" xmlns:p="http://schemas.openxmlformats.org/presentationml/2006/main">
   <p:cSld>
@@ -10321,12 +10643,14 @@
         </p:nvSpPr>
         <p:spPr/>
         <p:txBody>
-          <a:bodyPr/>
+          <a:bodyPr>
+            <a:normAutofit/>
+          </a:bodyPr>
           <a:lstStyle/>
           <a:p>
             <a:r>
               <a:rPr lang="en-US" dirty="0" smtClean="0"/>
-              <a:t>Other Veeam Features</a:t>
+              <a:t>Veeam Features For VM Restore</a:t>
             </a:r>
             <a:endParaRPr lang="en-US" dirty="0"/>
           </a:p>
@@ -10342,84 +10666,209 @@
             <p:ph sz="quarter" idx="1"/>
           </p:nvPr>
         </p:nvSpPr>
-        <p:spPr/>
-        <p:txBody>
-          <a:bodyPr/>
+        <p:spPr>
+          <a:xfrm>
+            <a:off x="612648" y="1600200"/>
+            <a:ext cx="8302752" cy="4832866"/>
+          </a:xfrm>
+        </p:spPr>
+        <p:txBody>
+          <a:bodyPr>
+            <a:normAutofit fontScale="77500" lnSpcReduction="20000"/>
+          </a:bodyPr>
           <a:lstStyle/>
           <a:p>
             <a:r>
+              <a:rPr lang="en-US" dirty="0" smtClean="0"/>
+              <a:t>Easier and quick restore</a:t>
+            </a:r>
+          </a:p>
+          <a:p>
+            <a:pPr lvl="1"/>
+            <a:r>
+              <a:rPr lang="en-US" dirty="0" smtClean="0">
+                <a:solidFill>
+                  <a:srgbClr val="FF0000"/>
+                </a:solidFill>
+              </a:rPr>
+              <a:t>1 click restore with a single or group VMs</a:t>
+            </a:r>
+          </a:p>
+          <a:p>
+            <a:r>
+              <a:rPr lang="en-US" dirty="0" smtClean="0"/>
+              <a:t>Easier test and verify backup</a:t>
+            </a:r>
+          </a:p>
+          <a:p>
+            <a:pPr lvl="1"/>
+            <a:r>
+              <a:rPr lang="en-US" dirty="0" smtClean="0">
+                <a:solidFill>
+                  <a:srgbClr val="FF0000"/>
+                </a:solidFill>
+              </a:rPr>
+              <a:t>Automatic verification</a:t>
+            </a:r>
+          </a:p>
+          <a:p>
+            <a:pPr lvl="1"/>
+            <a:r>
+              <a:rPr lang="en-US" dirty="0" smtClean="0">
+                <a:solidFill>
+                  <a:srgbClr val="FF0000"/>
+                </a:solidFill>
+              </a:rPr>
+              <a:t>On demand sandbox vs. dedicate virtual lab</a:t>
+            </a:r>
+          </a:p>
+          <a:p>
+            <a:r>
+              <a:rPr lang="en-US" dirty="0" smtClean="0"/>
+              <a:t>High backup usability</a:t>
+            </a:r>
+          </a:p>
+          <a:p>
+            <a:pPr lvl="1"/>
+            <a:r>
+              <a:rPr lang="en-US" dirty="0" smtClean="0"/>
+              <a:t>Instant </a:t>
+            </a:r>
+            <a:r>
               <a:rPr lang="en-US" dirty="0"/>
-              <a:t>Unlimited </a:t>
-            </a:r>
+              <a:t>recover + Storage </a:t>
+            </a:r>
+            <a:r>
+              <a:rPr lang="en-US" dirty="0" err="1"/>
+              <a:t>vMotion</a:t>
+            </a:r>
+            <a:endParaRPr lang="en-US" dirty="0"/>
+          </a:p>
+          <a:p>
             <a:r>
               <a:rPr lang="en-US" dirty="0" smtClean="0"/>
-              <a:t>Scale-out </a:t>
-            </a:r>
+              <a:t>Fine granularity restore based on one method</a:t>
+            </a:r>
+          </a:p>
+          <a:p>
+            <a:pPr lvl="1"/>
+            <a:r>
+              <a:rPr lang="en-US" dirty="0" smtClean="0"/>
+              <a:t>Image level restore</a:t>
+            </a:r>
+          </a:p>
+          <a:p>
+            <a:pPr lvl="2"/>
+            <a:r>
+              <a:rPr lang="en-US" dirty="0" smtClean="0"/>
+              <a:t>Full or incremental VM recovery with efficient VM search</a:t>
+            </a:r>
+          </a:p>
+          <a:p>
+            <a:pPr lvl="1"/>
+            <a:r>
+              <a:rPr lang="en-US" dirty="0" smtClean="0"/>
+              <a:t>File level restore</a:t>
+            </a:r>
+          </a:p>
+          <a:p>
+            <a:pPr lvl="2"/>
             <a:r>
               <a:rPr lang="en-US" dirty="0"/>
-              <a:t>Backup </a:t>
+              <a:t>File instant index and </a:t>
             </a:r>
             <a:r>
               <a:rPr lang="en-US" dirty="0" smtClean="0"/>
-              <a:t>Repository</a:t>
-            </a:r>
+              <a:t>search</a:t>
+            </a:r>
+            <a:endParaRPr lang="en-US" dirty="0" smtClean="0">
+              <a:solidFill>
+                <a:srgbClr val="FF0000"/>
+              </a:solidFill>
+            </a:endParaRPr>
+          </a:p>
+          <a:p>
+            <a:pPr lvl="2"/>
+            <a:r>
+              <a:rPr lang="en-US" dirty="0" smtClean="0">
+                <a:solidFill>
+                  <a:srgbClr val="FF0000"/>
+                </a:solidFill>
+              </a:rPr>
+              <a:t>Explorer for any type of file systems per VM images</a:t>
+            </a:r>
+            <a:endParaRPr lang="en-US" dirty="0" smtClean="0"/>
           </a:p>
           <a:p>
             <a:pPr lvl="1"/>
             <a:r>
               <a:rPr lang="en-US" dirty="0" smtClean="0"/>
-              <a:t>Management overheads with massive VMs</a:t>
-            </a:r>
-          </a:p>
-          <a:p>
-            <a:pPr lvl="1"/>
-            <a:r>
-              <a:rPr lang="en-US" dirty="0"/>
-              <a:t>Global </a:t>
+              <a:t>Application level restore</a:t>
+            </a:r>
+          </a:p>
+          <a:p>
+            <a:pPr lvl="2"/>
+            <a:r>
+              <a:rPr lang="en-US" dirty="0" smtClean="0">
+                <a:solidFill>
+                  <a:srgbClr val="FF0000"/>
+                </a:solidFill>
+              </a:rPr>
+              <a:t>RDB table &amp; records, Exchange mail items, Active Directory</a:t>
             </a:r>
             <a:r>
               <a:rPr lang="en-US" dirty="0" smtClean="0"/>
-              <a:t>Pool - break </a:t>
-            </a:r>
-            <a:r>
-              <a:rPr lang="en-US" dirty="0"/>
-              <a:t>backup target storage silos</a:t>
-            </a:r>
-          </a:p>
-          <a:p>
-            <a:pPr lvl="1"/>
+              <a:t> etc…</a:t>
+            </a:r>
+          </a:p>
+        </p:txBody>
+      </p:sp>
+      <p:sp>
+        <p:nvSpPr>
+          <p:cNvPr id="4" name="TextBox 3"/>
+          <p:cNvSpPr txBox="1"/>
+          <p:nvPr/>
+        </p:nvSpPr>
+        <p:spPr>
+          <a:xfrm>
+            <a:off x="533400" y="6471022"/>
+            <a:ext cx="7162800" cy="369332"/>
+          </a:xfrm>
+          <a:prstGeom prst="rect">
+            <a:avLst/>
+          </a:prstGeom>
+          <a:noFill/>
+        </p:spPr>
+        <p:txBody>
+          <a:bodyPr wrap="square" rtlCol="0">
+            <a:spAutoFit/>
+          </a:bodyPr>
+          <a:lstStyle/>
+          <a:p>
             <a:r>
               <a:rPr lang="en-US" dirty="0" smtClean="0"/>
-              <a:t>Storage </a:t>
-            </a:r>
-            <a:r>
-              <a:rPr lang="en-US" dirty="0"/>
-              <a:t>Aware </a:t>
+              <a:t>Note:  </a:t>
+            </a:r>
+            <a:r>
+              <a:rPr lang="en-US" dirty="0" smtClean="0">
+                <a:solidFill>
+                  <a:srgbClr val="FF0000"/>
+                </a:solidFill>
+              </a:rPr>
+              <a:t>Red color </a:t>
             </a:r>
             <a:r>
               <a:rPr lang="en-US" dirty="0" smtClean="0"/>
-              <a:t>Placement</a:t>
-            </a:r>
-          </a:p>
-          <a:p>
-            <a:pPr lvl="1"/>
-            <a:r>
-              <a:rPr lang="en-US" dirty="0" smtClean="0"/>
-              <a:t>Self-service backup - a backup storage cloud</a:t>
-            </a:r>
-          </a:p>
-          <a:p>
-            <a:r>
-              <a:rPr lang="en-US" dirty="0" smtClean="0"/>
-              <a:t>Cloud backup &amp; recovery</a:t>
-            </a:r>
+              <a:t>indicates Veeam strengths over other VM backup products</a:t>
+            </a:r>
+            <a:endParaRPr lang="en-US" dirty="0"/>
           </a:p>
         </p:txBody>
       </p:sp>
     </p:spTree>
     <p:extLst>
       <p:ext uri="{BB962C8B-B14F-4D97-AF65-F5344CB8AC3E}">
-        <p14:creationId xmlns:p14="http://schemas.microsoft.com/office/powerpoint/2010/main" val="1986612008"/>
+        <p14:creationId xmlns:p14="http://schemas.microsoft.com/office/powerpoint/2010/main" val="2338376958"/>
       </p:ext>
     </p:extLst>
   </p:cSld>
@@ -10463,6 +10912,143 @@
           <a:p>
             <a:r>
               <a:rPr lang="en-US" dirty="0" smtClean="0"/>
+              <a:t>Other Veeam Features</a:t>
+            </a:r>
+            <a:endParaRPr lang="en-US" dirty="0"/>
+          </a:p>
+        </p:txBody>
+      </p:sp>
+      <p:sp>
+        <p:nvSpPr>
+          <p:cNvPr id="3" name="Content Placeholder 2"/>
+          <p:cNvSpPr>
+            <a:spLocks noGrp="1"/>
+          </p:cNvSpPr>
+          <p:nvPr>
+            <p:ph sz="quarter" idx="1"/>
+          </p:nvPr>
+        </p:nvSpPr>
+        <p:spPr/>
+        <p:txBody>
+          <a:bodyPr/>
+          <a:lstStyle/>
+          <a:p>
+            <a:r>
+              <a:rPr lang="en-US" dirty="0"/>
+              <a:t>Unlimited </a:t>
+            </a:r>
+            <a:r>
+              <a:rPr lang="en-US" dirty="0" smtClean="0"/>
+              <a:t>Scale-out </a:t>
+            </a:r>
+            <a:r>
+              <a:rPr lang="en-US" dirty="0"/>
+              <a:t>Backup </a:t>
+            </a:r>
+            <a:r>
+              <a:rPr lang="en-US" dirty="0" smtClean="0"/>
+              <a:t>Repository</a:t>
+            </a:r>
+          </a:p>
+          <a:p>
+            <a:pPr lvl="1"/>
+            <a:r>
+              <a:rPr lang="en-US" dirty="0" smtClean="0"/>
+              <a:t>Management overheads with massive VMs</a:t>
+            </a:r>
+          </a:p>
+          <a:p>
+            <a:pPr lvl="1"/>
+            <a:r>
+              <a:rPr lang="en-US" dirty="0"/>
+              <a:t>Global </a:t>
+            </a:r>
+            <a:r>
+              <a:rPr lang="en-US" dirty="0" smtClean="0"/>
+              <a:t>Pool - break </a:t>
+            </a:r>
+            <a:r>
+              <a:rPr lang="en-US" dirty="0"/>
+              <a:t>backup target storage silos</a:t>
+            </a:r>
+          </a:p>
+          <a:p>
+            <a:pPr lvl="1"/>
+            <a:r>
+              <a:rPr lang="en-US" dirty="0" smtClean="0"/>
+              <a:t>Storage </a:t>
+            </a:r>
+            <a:r>
+              <a:rPr lang="en-US" dirty="0"/>
+              <a:t>Aware </a:t>
+            </a:r>
+            <a:r>
+              <a:rPr lang="en-US" dirty="0" smtClean="0"/>
+              <a:t>Placement</a:t>
+            </a:r>
+          </a:p>
+          <a:p>
+            <a:pPr lvl="1"/>
+            <a:r>
+              <a:rPr lang="en-US" dirty="0" smtClean="0"/>
+              <a:t>Self-service backup - a backup storage cloud</a:t>
+            </a:r>
+          </a:p>
+          <a:p>
+            <a:r>
+              <a:rPr lang="en-US" dirty="0" smtClean="0"/>
+              <a:t>Cloud backup &amp; recovery</a:t>
+            </a:r>
+          </a:p>
+        </p:txBody>
+      </p:sp>
+    </p:spTree>
+    <p:extLst>
+      <p:ext uri="{BB962C8B-B14F-4D97-AF65-F5344CB8AC3E}">
+        <p14:creationId xmlns:p14="http://schemas.microsoft.com/office/powerpoint/2010/main" val="1986612008"/>
+      </p:ext>
+    </p:extLst>
+  </p:cSld>
+  <p:clrMapOvr>
+    <a:masterClrMapping/>
+  </p:clrMapOvr>
+</p:sld>
+</file>
+
+<file path=ppt/slides/slide25.xml><?xml version="1.0" encoding="utf-8"?>
+<p:sld xmlns:a="http://schemas.openxmlformats.org/drawingml/2006/main" xmlns:r="http://schemas.openxmlformats.org/officeDocument/2006/relationships" xmlns:p="http://schemas.openxmlformats.org/presentationml/2006/main">
+  <p:cSld>
+    <p:spTree>
+      <p:nvGrpSpPr>
+        <p:cNvPr id="1" name=""/>
+        <p:cNvGrpSpPr/>
+        <p:nvPr/>
+      </p:nvGrpSpPr>
+      <p:grpSpPr>
+        <a:xfrm>
+          <a:off x="0" y="0"/>
+          <a:ext cx="0" cy="0"/>
+          <a:chOff x="0" y="0"/>
+          <a:chExt cx="0" cy="0"/>
+        </a:xfrm>
+      </p:grpSpPr>
+      <p:sp>
+        <p:nvSpPr>
+          <p:cNvPr id="2" name="Title 1"/>
+          <p:cNvSpPr>
+            <a:spLocks noGrp="1"/>
+          </p:cNvSpPr>
+          <p:nvPr>
+            <p:ph type="title"/>
+          </p:nvPr>
+        </p:nvSpPr>
+        <p:spPr/>
+        <p:txBody>
+          <a:bodyPr/>
+          <a:lstStyle/>
+          <a:p>
+            <a:r>
+              <a:rPr lang="en-US" dirty="0" smtClean="0"/>
               <a:t>Agenda</a:t>
             </a:r>
             <a:endParaRPr lang="en-US" dirty="0"/>
@@ -10536,7 +11122,7 @@
 </p:sld>
 </file>
 
-<file path=ppt/slides/slide25.xml><?xml version="1.0" encoding="utf-8"?>
+<file path=ppt/slides/slide26.xml><?xml version="1.0" encoding="utf-8"?>
 <p:sld xmlns:a="http://schemas.openxmlformats.org/drawingml/2006/main" xmlns:r="http://schemas.openxmlformats.org/officeDocument/2006/relationships" xmlns:p="http://schemas.openxmlformats.org/presentationml/2006/main">
   <p:cSld>
     <p:spTree>
@@ -10871,7 +11457,7 @@
 </p:sld>
 </file>
 
-<file path=ppt/slides/slide26.xml><?xml version="1.0" encoding="utf-8"?>
+<file path=ppt/slides/slide27.xml><?xml version="1.0" encoding="utf-8"?>
 <p:sld xmlns:a="http://schemas.openxmlformats.org/drawingml/2006/main" xmlns:r="http://schemas.openxmlformats.org/officeDocument/2006/relationships" xmlns:p="http://schemas.openxmlformats.org/presentationml/2006/main">
   <p:cSld>
     <p:spTree>
@@ -10935,12 +11521,12 @@
           <a:graphicData uri="http://schemas.openxmlformats.org/presentationml/2006/ole">
             <mc:AlternateContent xmlns:mc="http://schemas.openxmlformats.org/markup-compatibility/2006">
               <mc:Choice xmlns:v="urn:schemas-microsoft-com:vml" Requires="v">
-                <p:oleObj spid="_x0000_s6162" r:id="rId4" imgW="8303472" imgH="4700423" progId="Excel.Sheet.8">
+                <p:oleObj spid="_x0000_s6172" r:id="rId3" imgW="8303472" imgH="4700423" progId="Excel.Sheet.8">
                   <p:embed/>
                 </p:oleObj>
               </mc:Choice>
               <mc:Fallback>
-                <p:oleObj r:id="rId4" imgW="8303472" imgH="4700423" progId="Excel.Sheet.8">
+                <p:oleObj r:id="rId3" imgW="8303472" imgH="4700423" progId="Excel.Sheet.8">
                   <p:embed/>
                   <p:pic>
                     <p:nvPicPr>
@@ -10951,7 +11537,7 @@
                       <p:nvPr/>
                     </p:nvPicPr>
                     <p:blipFill>
-                      <a:blip r:embed="rId5">
+                      <a:blip r:embed="rId4">
                         <a:extLst>
                           <a:ext uri="{28A0092B-C50C-407E-A947-70E740481C1C}">
                             <a14:useLocalDpi xmlns:a14="http://schemas.microsoft.com/office/drawing/2010/main" val="0"/>
@@ -11134,7 +11720,7 @@
           <a:p>
             <a:r>
               <a:rPr lang="en-US" dirty="0" smtClean="0"/>
-              <a:t>RPO and RTO</a:t>
+              <a:t>Backup Window</a:t>
             </a:r>
             <a:endParaRPr lang="en-US" dirty="0"/>
           </a:p>
@@ -11153,159 +11739,81 @@
         <p:spPr/>
         <p:txBody>
           <a:bodyPr>
-            <a:normAutofit fontScale="77500" lnSpcReduction="20000"/>
+            <a:normAutofit/>
           </a:bodyPr>
           <a:lstStyle/>
           <a:p>
             <a:r>
-              <a:rPr lang="en-US" dirty="0"/>
-              <a:t>RPO -</a:t>
-            </a:r>
-            <a:r>
-              <a:rPr lang="en-US" dirty="0" smtClean="0"/>
-              <a:t> recovery </a:t>
-            </a:r>
-            <a:r>
-              <a:rPr lang="en-US" dirty="0"/>
-              <a:t>point </a:t>
-            </a:r>
-            <a:r>
-              <a:rPr lang="en-US" dirty="0" smtClean="0"/>
-              <a:t>objective</a:t>
+              <a:rPr lang="en-US" sz="2400" dirty="0"/>
+              <a:t>The period of time when backups are permitted to </a:t>
+            </a:r>
+            <a:r>
+              <a:rPr lang="en-US" sz="2400" dirty="0" smtClean="0"/>
+              <a:t>run</a:t>
             </a:r>
           </a:p>
           <a:p>
             <a:pPr lvl="1"/>
             <a:r>
-              <a:rPr lang="en-US" dirty="0" smtClean="0"/>
-              <a:t>Key data protection requirements per backup window</a:t>
+              <a:rPr lang="en-US" sz="2400" dirty="0" smtClean="0"/>
+              <a:t>Ensure backup has no interferences </a:t>
+            </a:r>
+            <a:r>
+              <a:rPr lang="en-US" sz="2400" dirty="0"/>
+              <a:t>with normal </a:t>
+            </a:r>
+            <a:r>
+              <a:rPr lang="en-US" sz="2400" dirty="0" smtClean="0"/>
+              <a:t>operations</a:t>
+            </a:r>
+          </a:p>
+          <a:p>
+            <a:r>
+              <a:rPr lang="en-US" sz="2400" dirty="0" smtClean="0"/>
+              <a:t>Backup </a:t>
+            </a:r>
+            <a:r>
+              <a:rPr lang="en-US" sz="2400" dirty="0"/>
+              <a:t>window is limited by backup performance</a:t>
+            </a:r>
+          </a:p>
+          <a:p>
+            <a:pPr lvl="1"/>
+            <a:r>
+              <a:rPr lang="en-US" sz="2400" dirty="0"/>
+              <a:t>Simultaneously backup jobs from backup </a:t>
+            </a:r>
+            <a:r>
+              <a:rPr lang="en-US" sz="2400" dirty="0" smtClean="0"/>
+              <a:t>source</a:t>
             </a:r>
           </a:p>
           <a:p>
             <a:pPr lvl="2"/>
             <a:r>
-              <a:rPr lang="en-US" dirty="0" smtClean="0"/>
-              <a:t>CDP(Continuous Data Protection)</a:t>
-            </a:r>
-          </a:p>
-          <a:p>
-            <a:pPr lvl="3"/>
-            <a:r>
-              <a:rPr lang="en-US" dirty="0"/>
-              <a:t>RPO is zero</a:t>
-            </a:r>
-          </a:p>
-          <a:p>
-            <a:pPr lvl="2"/>
-            <a:r>
-              <a:rPr lang="en-US" dirty="0" smtClean="0"/>
-              <a:t>Near CDP or CRR(Continuous Remote Replication)</a:t>
-            </a:r>
-          </a:p>
-          <a:p>
-            <a:pPr lvl="3"/>
-            <a:r>
-              <a:rPr lang="en-US" dirty="0"/>
-              <a:t>RPO is close to zero</a:t>
-            </a:r>
-          </a:p>
-          <a:p>
-            <a:pPr lvl="2"/>
-            <a:r>
-              <a:rPr lang="en-US" dirty="0" smtClean="0"/>
-              <a:t>Regular backup</a:t>
-            </a:r>
-          </a:p>
-          <a:p>
-            <a:pPr lvl="3"/>
-            <a:r>
-              <a:rPr lang="en-US" dirty="0" smtClean="0"/>
-              <a:t>Could be minutes, hourly, daily, weekly, monthly</a:t>
-            </a:r>
-          </a:p>
-          <a:p>
-            <a:r>
-              <a:rPr lang="en-US" dirty="0"/>
-              <a:t>RTO - recovery time </a:t>
-            </a:r>
-            <a:r>
-              <a:rPr lang="en-US" dirty="0" smtClean="0"/>
-              <a:t>objective</a:t>
+              <a:rPr lang="en-US" sz="2000" dirty="0"/>
+              <a:t>SDDC caused high application/VM density than physical</a:t>
             </a:r>
           </a:p>
           <a:p>
             <a:pPr lvl="1"/>
             <a:r>
-              <a:rPr lang="en-US" dirty="0" smtClean="0"/>
-              <a:t>Maximum </a:t>
-            </a:r>
-            <a:r>
-              <a:rPr lang="en-US" dirty="0"/>
-              <a:t>allowable or maximum tolerable </a:t>
-            </a:r>
-            <a:r>
-              <a:rPr lang="en-US" dirty="0" smtClean="0"/>
-              <a:t>outage</a:t>
-            </a:r>
-          </a:p>
-          <a:p>
-            <a:pPr lvl="2"/>
-            <a:r>
-              <a:rPr lang="en-US" dirty="0"/>
-              <a:t>RTO is </a:t>
-            </a:r>
-            <a:r>
-              <a:rPr lang="en-US" dirty="0" smtClean="0"/>
-              <a:t>close to zero</a:t>
-            </a:r>
-          </a:p>
-          <a:p>
-            <a:pPr lvl="3"/>
-            <a:r>
-              <a:rPr lang="en-US" sz="2100" dirty="0" smtClean="0"/>
-              <a:t>Stretched</a:t>
-            </a:r>
-            <a:r>
-              <a:rPr lang="en-US" dirty="0" smtClean="0"/>
-              <a:t> clusters: Active-active data center (Not real DR: see notes)</a:t>
-            </a:r>
-          </a:p>
-          <a:p>
-            <a:pPr lvl="3"/>
-            <a:r>
-              <a:rPr lang="en-US" dirty="0" smtClean="0"/>
-              <a:t>CDP </a:t>
-            </a:r>
-            <a:r>
-              <a:rPr lang="en-US" dirty="0"/>
-              <a:t>+ VMware </a:t>
-            </a:r>
-            <a:r>
-              <a:rPr lang="en-US" dirty="0" err="1"/>
-              <a:t>vCenter</a:t>
-            </a:r>
-            <a:r>
-              <a:rPr lang="en-US" dirty="0"/>
-              <a:t> Site Recovery Manager</a:t>
-            </a:r>
-            <a:endParaRPr lang="en-US" dirty="0" smtClean="0"/>
+              <a:rPr lang="en-US" sz="2400" dirty="0" smtClean="0"/>
+              <a:t>Backup </a:t>
+            </a:r>
+            <a:r>
+              <a:rPr lang="en-US" sz="2400" dirty="0"/>
+              <a:t>server workload</a:t>
+            </a:r>
           </a:p>
           <a:p>
             <a:pPr lvl="1"/>
             <a:r>
-              <a:rPr lang="en-US" dirty="0" smtClean="0"/>
-              <a:t>Key requirements for recover performance SLA</a:t>
-            </a:r>
-          </a:p>
-          <a:p>
-            <a:pPr lvl="1"/>
-            <a:r>
-              <a:rPr lang="en-US" dirty="0" smtClean="0"/>
-              <a:t>Associate with availability of backup infrastructure</a:t>
-            </a:r>
-          </a:p>
-          <a:p>
-            <a:pPr lvl="1"/>
+              <a:rPr lang="en-US" sz="2400" dirty="0"/>
+              <a:t>Data protection performance</a:t>
+            </a:r>
+          </a:p>
+          <a:p>
             <a:endParaRPr lang="en-US" dirty="0"/>
           </a:p>
         </p:txBody>
@@ -11313,7 +11821,7 @@
     </p:spTree>
     <p:extLst>
       <p:ext uri="{BB962C8B-B14F-4D97-AF65-F5344CB8AC3E}">
-        <p14:creationId xmlns:p14="http://schemas.microsoft.com/office/powerpoint/2010/main" val="3708020334"/>
+        <p14:creationId xmlns:p14="http://schemas.microsoft.com/office/powerpoint/2010/main" val="2227317416"/>
       </p:ext>
     </p:extLst>
   </p:cSld>
@@ -11357,7 +11865,7 @@
           <a:p>
             <a:r>
               <a:rPr lang="en-US" dirty="0" smtClean="0"/>
-              <a:t>Backup Methods</a:t>
+              <a:t>RPO and RTO</a:t>
             </a:r>
             <a:endParaRPr lang="en-US" dirty="0"/>
           </a:p>
@@ -11376,99 +11884,159 @@
         <p:spPr/>
         <p:txBody>
           <a:bodyPr>
-            <a:normAutofit fontScale="85000" lnSpcReduction="20000"/>
+            <a:normAutofit fontScale="77500" lnSpcReduction="20000"/>
           </a:bodyPr>
           <a:lstStyle/>
           <a:p>
             <a:r>
+              <a:rPr lang="en-US" dirty="0"/>
+              <a:t>RPO -</a:t>
+            </a:r>
+            <a:r>
               <a:rPr lang="en-US" dirty="0" smtClean="0"/>
-              <a:t>Available methods</a:t>
+              <a:t> recovery </a:t>
+            </a:r>
+            <a:r>
+              <a:rPr lang="en-US" dirty="0"/>
+              <a:t>point </a:t>
+            </a:r>
+            <a:r>
+              <a:rPr lang="en-US" dirty="0" smtClean="0"/>
+              <a:t>objective</a:t>
             </a:r>
           </a:p>
           <a:p>
             <a:pPr lvl="1"/>
             <a:r>
               <a:rPr lang="en-US" dirty="0" smtClean="0"/>
-              <a:t>Full</a:t>
+              <a:t>Key data protection requirements per backup window</a:t>
+            </a:r>
+          </a:p>
+          <a:p>
+            <a:pPr lvl="2"/>
+            <a:r>
+              <a:rPr lang="en-US" dirty="0" smtClean="0"/>
+              <a:t>CDP(Continuous Data Protection)</a:t>
+            </a:r>
+          </a:p>
+          <a:p>
+            <a:pPr lvl="3"/>
+            <a:r>
+              <a:rPr lang="en-US" dirty="0"/>
+              <a:t>RPO is zero</a:t>
+            </a:r>
+          </a:p>
+          <a:p>
+            <a:pPr lvl="2"/>
+            <a:r>
+              <a:rPr lang="en-US" dirty="0" smtClean="0"/>
+              <a:t>Near CDP or CRR(Continuous Remote Replication)</a:t>
+            </a:r>
+          </a:p>
+          <a:p>
+            <a:pPr lvl="3"/>
+            <a:r>
+              <a:rPr lang="en-US" dirty="0"/>
+              <a:t>RPO is close to zero</a:t>
+            </a:r>
+          </a:p>
+          <a:p>
+            <a:pPr lvl="2"/>
+            <a:r>
+              <a:rPr lang="en-US" dirty="0" smtClean="0"/>
+              <a:t>Regular backup</a:t>
+            </a:r>
+          </a:p>
+          <a:p>
+            <a:pPr lvl="3"/>
+            <a:r>
+              <a:rPr lang="en-US" dirty="0" smtClean="0"/>
+              <a:t>Could be minutes, hourly, daily, weekly, monthly</a:t>
+            </a:r>
+          </a:p>
+          <a:p>
+            <a:r>
+              <a:rPr lang="en-US" dirty="0"/>
+              <a:t>RTO - recovery time </a:t>
+            </a:r>
+            <a:r>
+              <a:rPr lang="en-US" dirty="0" smtClean="0"/>
+              <a:t>objective</a:t>
             </a:r>
           </a:p>
           <a:p>
             <a:pPr lvl="1"/>
             <a:r>
               <a:rPr lang="en-US" dirty="0" smtClean="0"/>
-              <a:t>Incremental</a:t>
-            </a:r>
+              <a:t>Maximum </a:t>
+            </a:r>
+            <a:r>
+              <a:rPr lang="en-US" dirty="0"/>
+              <a:t>allowable or maximum tolerable </a:t>
+            </a:r>
+            <a:r>
+              <a:rPr lang="en-US" dirty="0" smtClean="0"/>
+              <a:t>outage</a:t>
+            </a:r>
+          </a:p>
+          <a:p>
+            <a:pPr lvl="2"/>
+            <a:r>
+              <a:rPr lang="en-US" dirty="0"/>
+              <a:t>RTO is </a:t>
+            </a:r>
+            <a:r>
+              <a:rPr lang="en-US" dirty="0" smtClean="0"/>
+              <a:t>close to zero</a:t>
+            </a:r>
+          </a:p>
+          <a:p>
+            <a:pPr lvl="3"/>
+            <a:r>
+              <a:rPr lang="en-US" sz="2100" dirty="0" smtClean="0"/>
+              <a:t>Stretched</a:t>
+            </a:r>
+            <a:r>
+              <a:rPr lang="en-US" dirty="0" smtClean="0"/>
+              <a:t> clusters: Active-active data center (Not real DR: see notes)</a:t>
+            </a:r>
+          </a:p>
+          <a:p>
+            <a:pPr lvl="3"/>
+            <a:r>
+              <a:rPr lang="en-US" dirty="0" smtClean="0"/>
+              <a:t>CDP </a:t>
+            </a:r>
+            <a:r>
+              <a:rPr lang="en-US" dirty="0"/>
+              <a:t>+ VMware </a:t>
+            </a:r>
+            <a:r>
+              <a:rPr lang="en-US" dirty="0" err="1"/>
+              <a:t>vCenter</a:t>
+            </a:r>
+            <a:r>
+              <a:rPr lang="en-US" dirty="0"/>
+              <a:t> Site Recovery Manager</a:t>
+            </a:r>
+            <a:endParaRPr lang="en-US" dirty="0" smtClean="0"/>
           </a:p>
           <a:p>
             <a:pPr lvl="1"/>
             <a:r>
               <a:rPr lang="en-US" dirty="0" smtClean="0"/>
-              <a:t>Differential</a:t>
+              <a:t>Key requirements for recover performance SLA</a:t>
             </a:r>
           </a:p>
           <a:p>
             <a:pPr lvl="1"/>
             <a:r>
               <a:rPr lang="en-US" dirty="0" smtClean="0"/>
-              <a:t>Synthetic</a:t>
-            </a:r>
-            <a:endParaRPr lang="en-US" dirty="0"/>
-          </a:p>
-          <a:p>
-            <a:r>
-              <a:rPr lang="en-US" dirty="0" smtClean="0"/>
-              <a:t>Factors for choosing the backup methods</a:t>
+              <a:t>Associate with availability of backup infrastructure</a:t>
             </a:r>
           </a:p>
           <a:p>
             <a:pPr lvl="1"/>
-            <a:r>
-              <a:rPr lang="en-US" dirty="0" smtClean="0"/>
-              <a:t>RPO</a:t>
-            </a:r>
-          </a:p>
-          <a:p>
-            <a:pPr lvl="1"/>
-            <a:r>
-              <a:rPr lang="en-US" dirty="0" smtClean="0"/>
-              <a:t>RTO</a:t>
-            </a:r>
-          </a:p>
-          <a:p>
-            <a:pPr lvl="1"/>
-            <a:r>
-              <a:rPr lang="en-US" dirty="0" smtClean="0"/>
-              <a:t>Backup windows</a:t>
-            </a:r>
-          </a:p>
-          <a:p>
-            <a:pPr lvl="1"/>
-            <a:r>
-              <a:rPr lang="en-US" dirty="0"/>
-              <a:t>Retention timeframes</a:t>
-            </a:r>
-          </a:p>
-          <a:p>
-            <a:pPr lvl="1"/>
-            <a:r>
-              <a:rPr lang="en-US" dirty="0" smtClean="0"/>
-              <a:t>Infrastructure</a:t>
-            </a:r>
-            <a:endParaRPr lang="en-US" dirty="0"/>
-          </a:p>
-          <a:p>
-            <a:pPr lvl="1"/>
-            <a:r>
-              <a:rPr lang="en-US" dirty="0" smtClean="0"/>
-              <a:t>Budgets</a:t>
-            </a:r>
-          </a:p>
-          <a:p>
-            <a:pPr lvl="1"/>
-            <a:endParaRPr lang="en-US" dirty="0" smtClean="0"/>
-          </a:p>
-          <a:p>
-            <a:pPr lvl="2"/>
             <a:endParaRPr lang="en-US" dirty="0"/>
           </a:p>
         </p:txBody>
@@ -11476,7 +12044,7 @@
     </p:spTree>
     <p:extLst>
       <p:ext uri="{BB962C8B-B14F-4D97-AF65-F5344CB8AC3E}">
-        <p14:creationId xmlns:p14="http://schemas.microsoft.com/office/powerpoint/2010/main" val="1385607467"/>
+        <p14:creationId xmlns:p14="http://schemas.microsoft.com/office/powerpoint/2010/main" val="3708020334"/>
       </p:ext>
     </p:extLst>
   </p:cSld>
@@ -11520,7 +12088,7 @@
           <a:p>
             <a:r>
               <a:rPr lang="en-US" dirty="0" smtClean="0"/>
-              <a:t>Backup Window</a:t>
+              <a:t>Backup Methods</a:t>
             </a:r>
             <a:endParaRPr lang="en-US" dirty="0"/>
           </a:p>
@@ -11538,51 +12106,100 @@
         </p:nvSpPr>
         <p:spPr/>
         <p:txBody>
-          <a:bodyPr/>
+          <a:bodyPr>
+            <a:normAutofit fontScale="85000" lnSpcReduction="20000"/>
+          </a:bodyPr>
           <a:lstStyle/>
           <a:p>
             <a:r>
-              <a:rPr lang="en-US" sz="2800" dirty="0"/>
-              <a:t>Backup window is limited by backup performance</a:t>
+              <a:rPr lang="en-US" dirty="0" smtClean="0"/>
+              <a:t>Available methods</a:t>
             </a:r>
           </a:p>
           <a:p>
             <a:pPr lvl="1"/>
             <a:r>
+              <a:rPr lang="en-US" dirty="0" smtClean="0"/>
+              <a:t>Full</a:t>
+            </a:r>
+          </a:p>
+          <a:p>
+            <a:pPr lvl="1"/>
+            <a:r>
+              <a:rPr lang="en-US" dirty="0" smtClean="0"/>
+              <a:t>Incremental</a:t>
+            </a:r>
+          </a:p>
+          <a:p>
+            <a:pPr lvl="1"/>
+            <a:r>
+              <a:rPr lang="en-US" dirty="0" smtClean="0"/>
+              <a:t>Differential</a:t>
+            </a:r>
+          </a:p>
+          <a:p>
+            <a:pPr lvl="1"/>
+            <a:r>
+              <a:rPr lang="en-US" dirty="0" smtClean="0"/>
+              <a:t>Synthetic</a:t>
+            </a:r>
+            <a:endParaRPr lang="en-US" dirty="0"/>
+          </a:p>
+          <a:p>
+            <a:r>
+              <a:rPr lang="en-US" dirty="0" smtClean="0"/>
+              <a:t>Factors for choosing the backup methods</a:t>
+            </a:r>
+          </a:p>
+          <a:p>
+            <a:pPr lvl="1"/>
+            <a:r>
+              <a:rPr lang="en-US" dirty="0" smtClean="0"/>
+              <a:t>RPO</a:t>
+            </a:r>
+          </a:p>
+          <a:p>
+            <a:pPr lvl="1"/>
+            <a:r>
+              <a:rPr lang="en-US" dirty="0" smtClean="0"/>
+              <a:t>RTO</a:t>
+            </a:r>
+          </a:p>
+          <a:p>
+            <a:pPr lvl="1"/>
+            <a:r>
+              <a:rPr lang="en-US" dirty="0" smtClean="0"/>
+              <a:t>Backup windows</a:t>
+            </a:r>
+          </a:p>
+          <a:p>
+            <a:pPr lvl="1"/>
+            <a:r>
               <a:rPr lang="en-US" dirty="0"/>
-              <a:t>Simultaneously backup jobs from backup </a:t>
-            </a:r>
+              <a:t>Retention timeframes</a:t>
+            </a:r>
+          </a:p>
+          <a:p>
+            <a:pPr lvl="1"/>
             <a:r>
               <a:rPr lang="en-US" dirty="0" smtClean="0"/>
-              <a:t>source</a:t>
-            </a:r>
+              <a:t>Infrastructure</a:t>
+            </a:r>
+            <a:endParaRPr lang="en-US" dirty="0"/>
+          </a:p>
+          <a:p>
+            <a:pPr lvl="1"/>
+            <a:r>
+              <a:rPr lang="en-US" dirty="0" smtClean="0"/>
+              <a:t>Budgets</a:t>
+            </a:r>
+          </a:p>
+          <a:p>
+            <a:pPr lvl="1"/>
+            <a:endParaRPr lang="en-US" dirty="0" smtClean="0"/>
           </a:p>
           <a:p>
             <a:pPr lvl="2"/>
-            <a:r>
-              <a:rPr lang="en-US" dirty="0"/>
-              <a:t>SDDC caused high application/VM density than physical</a:t>
-            </a:r>
-          </a:p>
-          <a:p>
-            <a:pPr lvl="1"/>
-            <a:r>
-              <a:rPr lang="en-US" dirty="0" smtClean="0"/>
-              <a:t>Backup </a:t>
-            </a:r>
-            <a:r>
-              <a:rPr lang="en-US" dirty="0"/>
-              <a:t>server workload</a:t>
-            </a:r>
-          </a:p>
-          <a:p>
-            <a:pPr lvl="1"/>
-            <a:r>
-              <a:rPr lang="en-US" dirty="0"/>
-              <a:t>Data protection performance</a:t>
-            </a:r>
-          </a:p>
-          <a:p>
             <a:endParaRPr lang="en-US" dirty="0"/>
           </a:p>
         </p:txBody>
@@ -11590,7 +12207,7 @@
     </p:spTree>
     <p:extLst>
       <p:ext uri="{BB962C8B-B14F-4D97-AF65-F5344CB8AC3E}">
-        <p14:creationId xmlns:p14="http://schemas.microsoft.com/office/powerpoint/2010/main" val="2227317416"/>
+        <p14:creationId xmlns:p14="http://schemas.microsoft.com/office/powerpoint/2010/main" val="1385607467"/>
       </p:ext>
     </p:extLst>
   </p:cSld>

</xml_diff>